<commit_message>
Added lectures on interpolation and linear algebra
</commit_message>
<xml_diff>
--- a/slides/Lecture4-01-23-25-LinearAlgebra.pptx
+++ b/slides/Lecture4-01-23-25-LinearAlgebra.pptx
@@ -6051,10 +6051,16 @@
           <a:lstStyle/>
           <a:p>
             <a:r>
+              <a:rPr lang="en-US" sz="2200">
+                <a:latin typeface="LM Sans 10" panose="00000500000000000000" pitchFamily="50" charset="0"/>
+              </a:rPr>
+              <a:t>Lecture 4: </a:t>
+            </a:r>
+            <a:r>
               <a:rPr lang="en-US" sz="2200" dirty="0">
                 <a:latin typeface="LM Sans 10" panose="00000500000000000000" pitchFamily="50" charset="0"/>
               </a:rPr>
-              <a:t>Lecture 13: Linear algebra and matrices</a:t>
+              <a:t>Linear algebra and matrices</a:t>
             </a:r>
             <a:endParaRPr lang="uk-UA" sz="2200" dirty="0">
               <a:latin typeface="+mj-lt"/>
@@ -8932,8 +8938,8 @@
           </a:prstGeom>
         </p:spPr>
       </p:pic>
-      <mc:AlternateContent xmlns:mc="http://schemas.openxmlformats.org/markup-compatibility/2006">
-        <mc:Choice xmlns:a14="http://schemas.microsoft.com/office/drawing/2010/main" Requires="a14">
+      <mc:AlternateContent xmlns:mc="http://schemas.openxmlformats.org/markup-compatibility/2006" xmlns:a14="http://schemas.microsoft.com/office/drawing/2010/main">
+        <mc:Choice Requires="a14">
           <p:sp>
             <p:nvSpPr>
               <p:cNvPr id="11" name="Rectangle 10">
@@ -8991,7 +8997,7 @@
             </p:txBody>
           </p:sp>
         </mc:Choice>
-        <mc:Fallback>
+        <mc:Fallback xmlns="">
           <p:sp>
             <p:nvSpPr>
               <p:cNvPr id="11" name="Rectangle 10">
@@ -9036,8 +9042,8 @@
           </p:sp>
         </mc:Fallback>
       </mc:AlternateContent>
-      <mc:AlternateContent xmlns:mc="http://schemas.openxmlformats.org/markup-compatibility/2006">
-        <mc:Choice xmlns:a14="http://schemas.microsoft.com/office/drawing/2010/main" Requires="a14">
+      <mc:AlternateContent xmlns:mc="http://schemas.openxmlformats.org/markup-compatibility/2006" xmlns:a14="http://schemas.microsoft.com/office/drawing/2010/main">
+        <mc:Choice Requires="a14">
           <p:sp>
             <p:nvSpPr>
               <p:cNvPr id="12" name="Rectangle 11">
@@ -9181,7 +9187,7 @@
             </p:txBody>
           </p:sp>
         </mc:Choice>
-        <mc:Fallback>
+        <mc:Fallback xmlns="">
           <p:sp>
             <p:nvSpPr>
               <p:cNvPr id="12" name="Rectangle 11">

</xml_diff>